<commit_message>
Corrected text in boxes
</commit_message>
<xml_diff>
--- a/docs/assets/img/SUMMA_parameters_spec_order.pptx
+++ b/docs/assets/img/SUMMA_parameters_spec_order.pptx
@@ -254,7 +254,7 @@
           <a:p>
             <a:fld id="{8782807A-177A-174E-BAF3-A1E1B7E2EB65}" type="datetimeFigureOut">
               <a:rPr lang="en-US" smtClean="0"/>
-              <a:t>9/8/17</a:t>
+              <a:t>9/9/17</a:t>
             </a:fld>
             <a:endParaRPr lang="en-US"/>
           </a:p>
@@ -424,7 +424,7 @@
           <a:p>
             <a:fld id="{8782807A-177A-174E-BAF3-A1E1B7E2EB65}" type="datetimeFigureOut">
               <a:rPr lang="en-US" smtClean="0"/>
-              <a:t>9/8/17</a:t>
+              <a:t>9/9/17</a:t>
             </a:fld>
             <a:endParaRPr lang="en-US"/>
           </a:p>
@@ -604,7 +604,7 @@
           <a:p>
             <a:fld id="{8782807A-177A-174E-BAF3-A1E1B7E2EB65}" type="datetimeFigureOut">
               <a:rPr lang="en-US" smtClean="0"/>
-              <a:t>9/8/17</a:t>
+              <a:t>9/9/17</a:t>
             </a:fld>
             <a:endParaRPr lang="en-US"/>
           </a:p>
@@ -774,7 +774,7 @@
           <a:p>
             <a:fld id="{8782807A-177A-174E-BAF3-A1E1B7E2EB65}" type="datetimeFigureOut">
               <a:rPr lang="en-US" smtClean="0"/>
-              <a:t>9/8/17</a:t>
+              <a:t>9/9/17</a:t>
             </a:fld>
             <a:endParaRPr lang="en-US"/>
           </a:p>
@@ -1020,7 +1020,7 @@
           <a:p>
             <a:fld id="{8782807A-177A-174E-BAF3-A1E1B7E2EB65}" type="datetimeFigureOut">
               <a:rPr lang="en-US" smtClean="0"/>
-              <a:t>9/8/17</a:t>
+              <a:t>9/9/17</a:t>
             </a:fld>
             <a:endParaRPr lang="en-US"/>
           </a:p>
@@ -1252,7 +1252,7 @@
           <a:p>
             <a:fld id="{8782807A-177A-174E-BAF3-A1E1B7E2EB65}" type="datetimeFigureOut">
               <a:rPr lang="en-US" smtClean="0"/>
-              <a:t>9/8/17</a:t>
+              <a:t>9/9/17</a:t>
             </a:fld>
             <a:endParaRPr lang="en-US"/>
           </a:p>
@@ -1619,7 +1619,7 @@
           <a:p>
             <a:fld id="{8782807A-177A-174E-BAF3-A1E1B7E2EB65}" type="datetimeFigureOut">
               <a:rPr lang="en-US" smtClean="0"/>
-              <a:t>9/8/17</a:t>
+              <a:t>9/9/17</a:t>
             </a:fld>
             <a:endParaRPr lang="en-US"/>
           </a:p>
@@ -1737,7 +1737,7 @@
           <a:p>
             <a:fld id="{8782807A-177A-174E-BAF3-A1E1B7E2EB65}" type="datetimeFigureOut">
               <a:rPr lang="en-US" smtClean="0"/>
-              <a:t>9/8/17</a:t>
+              <a:t>9/9/17</a:t>
             </a:fld>
             <a:endParaRPr lang="en-US"/>
           </a:p>
@@ -1832,7 +1832,7 @@
           <a:p>
             <a:fld id="{8782807A-177A-174E-BAF3-A1E1B7E2EB65}" type="datetimeFigureOut">
               <a:rPr lang="en-US" smtClean="0"/>
-              <a:t>9/8/17</a:t>
+              <a:t>9/9/17</a:t>
             </a:fld>
             <a:endParaRPr lang="en-US"/>
           </a:p>
@@ -2109,7 +2109,7 @@
           <a:p>
             <a:fld id="{8782807A-177A-174E-BAF3-A1E1B7E2EB65}" type="datetimeFigureOut">
               <a:rPr lang="en-US" smtClean="0"/>
-              <a:t>9/8/17</a:t>
+              <a:t>9/9/17</a:t>
             </a:fld>
             <a:endParaRPr lang="en-US"/>
           </a:p>
@@ -2362,7 +2362,7 @@
           <a:p>
             <a:fld id="{8782807A-177A-174E-BAF3-A1E1B7E2EB65}" type="datetimeFigureOut">
               <a:rPr lang="en-US" smtClean="0"/>
-              <a:t>9/8/17</a:t>
+              <a:t>9/9/17</a:t>
             </a:fld>
             <a:endParaRPr lang="en-US"/>
           </a:p>
@@ -2575,7 +2575,7 @@
           <a:p>
             <a:fld id="{8782807A-177A-174E-BAF3-A1E1B7E2EB65}" type="datetimeFigureOut">
               <a:rPr lang="en-US" smtClean="0"/>
-              <a:t>9/8/17</a:t>
+              <a:t>9/9/17</a:t>
             </a:fld>
             <a:endParaRPr lang="en-US"/>
           </a:p>
@@ -3017,7 +3017,11 @@
             <a:pPr algn="ctr"/>
             <a:r>
               <a:rPr lang="en-US" dirty="0" smtClean="0"/>
-              <a:t>Trial parameters file</a:t>
+              <a:t>Local parameters </a:t>
+            </a:r>
+            <a:r>
+              <a:rPr lang="en-US" dirty="0" smtClean="0"/>
+              <a:t>file</a:t>
             </a:r>
           </a:p>
           <a:p>
@@ -3034,8 +3038,12 @@
           <a:p>
             <a:pPr algn="ctr"/>
             <a:r>
+              <a:rPr lang="en-US" smtClean="0"/>
+              <a:t>LOCALPARAM_INFO </a:t>
+            </a:r>
+            <a:r>
               <a:rPr lang="en-US" dirty="0" smtClean="0"/>
-              <a:t>PARAMETER_TRIAL -- ASCII</a:t>
+              <a:t>-- ASCII</a:t>
             </a:r>
             <a:endParaRPr lang="en-US" dirty="0"/>
           </a:p>
@@ -3262,7 +3270,11 @@
             <a:pPr algn="ctr"/>
             <a:r>
               <a:rPr lang="en-US" dirty="0" smtClean="0"/>
-              <a:t>Trial parameters file </a:t>
+              <a:t>Trial parameters </a:t>
+            </a:r>
+            <a:r>
+              <a:rPr lang="en-US" dirty="0" smtClean="0"/>
+              <a:t>file </a:t>
             </a:r>
           </a:p>
           <a:p>
@@ -3285,7 +3297,11 @@
             <a:pPr algn="ctr"/>
             <a:r>
               <a:rPr lang="en-US" dirty="0" smtClean="0"/>
-              <a:t>PARAMETER_TRIAL -- ASCII</a:t>
+              <a:t>PARAMETER_TRIAL -- </a:t>
+            </a:r>
+            <a:r>
+              <a:rPr lang="en-US" dirty="0" smtClean="0"/>
+              <a:t>NC</a:t>
             </a:r>
             <a:endParaRPr lang="en-US" dirty="0"/>
           </a:p>
@@ -3531,7 +3547,6 @@
               <a:rPr lang="en-US" dirty="0"/>
               <a:t>3</a:t>
             </a:r>
-            <a:endParaRPr lang="en-US" dirty="0"/>
           </a:p>
         </p:txBody>
       </p:sp>
@@ -3583,7 +3598,6 @@
               <a:rPr lang="en-US" dirty="0"/>
               <a:t>4</a:t>
             </a:r>
-            <a:endParaRPr lang="en-US" dirty="0"/>
           </a:p>
         </p:txBody>
       </p:sp>

</xml_diff>